<commit_message>
Annotator table and graph
</commit_message>
<xml_diff>
--- a/Presentations/EMR Interroperability V0.2.pptx
+++ b/Presentations/EMR Interroperability V0.2.pptx
@@ -7,7 +7,7 @@
     <p:sldMasterId id="2147483674" r:id="rId3"/>
   </p:sldMasterIdLst>
   <p:notesMasterIdLst>
-    <p:notesMasterId r:id="rId19"/>
+    <p:notesMasterId r:id="rId20"/>
   </p:notesMasterIdLst>
   <p:sldIdLst>
     <p:sldId id="256" r:id="rId4"/>
@@ -24,7 +24,8 @@
     <p:sldId id="267" r:id="rId15"/>
     <p:sldId id="268" r:id="rId16"/>
     <p:sldId id="269" r:id="rId17"/>
-    <p:sldId id="270" r:id="rId18"/>
+    <p:sldId id="271" r:id="rId18"/>
+    <p:sldId id="270" r:id="rId19"/>
   </p:sldIdLst>
   <p:sldSz cx="12192000" cy="6858000"/>
   <p:notesSz cx="6797675" cy="9929813"/>
@@ -129,6 +130,860 @@
     </p:ext>
   </p:extLst>
 </p:presentation>
+</file>
+
+<file path=ppt/charts/chart1.xml><?xml version="1.0" encoding="utf-8"?>
+<c:chartSpace xmlns:c="http://schemas.openxmlformats.org/drawingml/2006/chart" xmlns:a="http://schemas.openxmlformats.org/drawingml/2006/main" xmlns:r="http://schemas.openxmlformats.org/officeDocument/2006/relationships" xmlns:c16r2="http://schemas.microsoft.com/office/drawing/2015/06/chart">
+  <c:date1904 val="0"/>
+  <c:lang val="en-US"/>
+  <c:roundedCorners val="0"/>
+  <mc:AlternateContent xmlns:mc="http://schemas.openxmlformats.org/markup-compatibility/2006">
+    <mc:Choice xmlns:c14="http://schemas.microsoft.com/office/drawing/2007/8/2/chart" Requires="c14">
+      <c14:style val="102"/>
+    </mc:Choice>
+    <mc:Fallback>
+      <c:style val="2"/>
+    </mc:Fallback>
+  </mc:AlternateContent>
+  <c:chart>
+    <c:autoTitleDeleted val="1"/>
+    <c:plotArea>
+      <c:layout/>
+      <c:barChart>
+        <c:barDir val="col"/>
+        <c:grouping val="clustered"/>
+        <c:varyColors val="0"/>
+        <c:ser>
+          <c:idx val="0"/>
+          <c:order val="0"/>
+          <c:tx>
+            <c:strRef>
+              <c:f>KappaInterAnnotatorAgrement!$B$1</c:f>
+              <c:strCache>
+                <c:ptCount val="1"/>
+                <c:pt idx="0">
+                  <c:v>Kappa Score</c:v>
+                </c:pt>
+              </c:strCache>
+            </c:strRef>
+          </c:tx>
+          <c:spPr>
+            <a:solidFill>
+              <a:schemeClr val="accent1"/>
+            </a:solidFill>
+            <a:ln>
+              <a:solidFill>
+                <a:schemeClr val="tx1"/>
+              </a:solidFill>
+            </a:ln>
+            <a:effectLst/>
+          </c:spPr>
+          <c:invertIfNegative val="0"/>
+          <c:dLbls>
+            <c:spPr>
+              <a:noFill/>
+              <a:ln>
+                <a:noFill/>
+              </a:ln>
+              <a:effectLst/>
+            </c:spPr>
+            <c:txPr>
+              <a:bodyPr rot="0" spcFirstLastPara="1" vertOverflow="ellipsis" vert="horz" wrap="square" lIns="38100" tIns="19050" rIns="38100" bIns="19050" anchor="ctr" anchorCtr="1">
+                <a:spAutoFit/>
+              </a:bodyPr>
+              <a:lstStyle/>
+              <a:p>
+                <a:pPr>
+                  <a:defRPr sz="1000" b="0" i="0" u="none" strike="noStrike" kern="1200" baseline="0">
+                    <a:solidFill>
+                      <a:schemeClr val="tx1"/>
+                    </a:solidFill>
+                    <a:latin typeface="Calibri" panose="020F0502020204030204" pitchFamily="34" charset="0"/>
+                    <a:ea typeface="+mn-ea"/>
+                    <a:cs typeface="Calibri" panose="020F0502020204030204" pitchFamily="34" charset="0"/>
+                  </a:defRPr>
+                </a:pPr>
+                <a:endParaRPr lang="en-US"/>
+              </a:p>
+            </c:txPr>
+            <c:dLblPos val="outEnd"/>
+            <c:showLegendKey val="0"/>
+            <c:showVal val="1"/>
+            <c:showCatName val="0"/>
+            <c:showSerName val="0"/>
+            <c:showPercent val="0"/>
+            <c:showBubbleSize val="0"/>
+            <c:showLeaderLines val="0"/>
+            <c:extLst>
+              <c:ext xmlns:c15="http://schemas.microsoft.com/office/drawing/2012/chart" uri="{CE6537A1-D6FC-4f65-9D91-7224C49458BB}">
+                <c15:layout/>
+                <c15:showLeaderLines val="1"/>
+                <c15:leaderLines>
+                  <c:spPr>
+                    <a:ln w="9525" cap="flat" cmpd="sng" algn="ctr">
+                      <a:solidFill>
+                        <a:schemeClr val="tx1">
+                          <a:lumMod val="35000"/>
+                          <a:lumOff val="65000"/>
+                        </a:schemeClr>
+                      </a:solidFill>
+                      <a:round/>
+                    </a:ln>
+                    <a:effectLst/>
+                  </c:spPr>
+                </c15:leaderLines>
+              </c:ext>
+            </c:extLst>
+          </c:dLbls>
+          <c:cat>
+            <c:strRef>
+              <c:f>KappaInterAnnotatorAgrement!$A$2:$A$7</c:f>
+              <c:strCache>
+                <c:ptCount val="6"/>
+                <c:pt idx="0">
+                  <c:v>Annotator1 vs Annnotator2</c:v>
+                </c:pt>
+                <c:pt idx="1">
+                  <c:v>Annotator1 vs Annnotator3</c:v>
+                </c:pt>
+                <c:pt idx="2">
+                  <c:v>Annotator1 vs Annnotator4</c:v>
+                </c:pt>
+                <c:pt idx="3">
+                  <c:v>Annotator2 vs Annnotator3</c:v>
+                </c:pt>
+                <c:pt idx="4">
+                  <c:v>Annotator2 vs Annnotator4</c:v>
+                </c:pt>
+                <c:pt idx="5">
+                  <c:v>Annotator3 vs Annnotator4</c:v>
+                </c:pt>
+              </c:strCache>
+            </c:strRef>
+          </c:cat>
+          <c:val>
+            <c:numRef>
+              <c:f>KappaInterAnnotatorAgrement!$B$2:$B$7</c:f>
+              <c:numCache>
+                <c:formatCode>General</c:formatCode>
+                <c:ptCount val="6"/>
+                <c:pt idx="0">
+                  <c:v>0.7</c:v>
+                </c:pt>
+                <c:pt idx="1">
+                  <c:v>0.18</c:v>
+                </c:pt>
+                <c:pt idx="2">
+                  <c:v>0.8</c:v>
+                </c:pt>
+                <c:pt idx="3">
+                  <c:v>0.16</c:v>
+                </c:pt>
+                <c:pt idx="4">
+                  <c:v>0.77</c:v>
+                </c:pt>
+                <c:pt idx="5">
+                  <c:v>0.17</c:v>
+                </c:pt>
+              </c:numCache>
+            </c:numRef>
+          </c:val>
+          <c:extLst>
+            <c:ext xmlns:c16="http://schemas.microsoft.com/office/drawing/2014/chart" uri="{C3380CC4-5D6E-409C-BE32-E72D297353CC}">
+              <c16:uniqueId val="{00000000-C6E2-4295-8400-0064C72CC87E}"/>
+            </c:ext>
+          </c:extLst>
+        </c:ser>
+        <c:dLbls>
+          <c:dLblPos val="outEnd"/>
+          <c:showLegendKey val="0"/>
+          <c:showVal val="1"/>
+          <c:showCatName val="0"/>
+          <c:showSerName val="0"/>
+          <c:showPercent val="0"/>
+          <c:showBubbleSize val="0"/>
+        </c:dLbls>
+        <c:gapWidth val="219"/>
+        <c:overlap val="-27"/>
+        <c:axId val="405814240"/>
+        <c:axId val="405815904"/>
+      </c:barChart>
+      <c:catAx>
+        <c:axId val="405814240"/>
+        <c:scaling>
+          <c:orientation val="minMax"/>
+        </c:scaling>
+        <c:delete val="0"/>
+        <c:axPos val="b"/>
+        <c:numFmt formatCode="General" sourceLinked="1"/>
+        <c:majorTickMark val="none"/>
+        <c:minorTickMark val="none"/>
+        <c:tickLblPos val="nextTo"/>
+        <c:spPr>
+          <a:noFill/>
+          <a:ln w="9525" cap="flat" cmpd="sng" algn="ctr">
+            <a:solidFill>
+              <a:schemeClr val="tx1"/>
+            </a:solidFill>
+            <a:round/>
+          </a:ln>
+          <a:effectLst/>
+        </c:spPr>
+        <c:txPr>
+          <a:bodyPr rot="-60000000" spcFirstLastPara="1" vertOverflow="ellipsis" vert="horz" wrap="square" anchor="ctr" anchorCtr="1"/>
+          <a:lstStyle/>
+          <a:p>
+            <a:pPr>
+              <a:defRPr sz="1000" b="0" i="0" u="none" strike="noStrike" kern="1200" baseline="0">
+                <a:solidFill>
+                  <a:schemeClr val="tx1"/>
+                </a:solidFill>
+                <a:latin typeface="Calibri" panose="020F0502020204030204" pitchFamily="34" charset="0"/>
+                <a:ea typeface="+mn-ea"/>
+                <a:cs typeface="Calibri" panose="020F0502020204030204" pitchFamily="34" charset="0"/>
+              </a:defRPr>
+            </a:pPr>
+            <a:endParaRPr lang="en-US"/>
+          </a:p>
+        </c:txPr>
+        <c:crossAx val="405815904"/>
+        <c:crosses val="autoZero"/>
+        <c:auto val="1"/>
+        <c:lblAlgn val="ctr"/>
+        <c:lblOffset val="100"/>
+        <c:noMultiLvlLbl val="0"/>
+      </c:catAx>
+      <c:valAx>
+        <c:axId val="405815904"/>
+        <c:scaling>
+          <c:orientation val="minMax"/>
+          <c:max val="1"/>
+          <c:min val="0"/>
+        </c:scaling>
+        <c:delete val="0"/>
+        <c:axPos val="l"/>
+        <c:majorGridlines>
+          <c:spPr>
+            <a:ln w="9525" cap="flat" cmpd="sng" algn="ctr">
+              <a:solidFill>
+                <a:schemeClr val="tx1">
+                  <a:lumMod val="15000"/>
+                  <a:lumOff val="85000"/>
+                </a:schemeClr>
+              </a:solidFill>
+              <a:round/>
+            </a:ln>
+            <a:effectLst/>
+          </c:spPr>
+        </c:majorGridlines>
+        <c:numFmt formatCode="General" sourceLinked="1"/>
+        <c:majorTickMark val="none"/>
+        <c:minorTickMark val="none"/>
+        <c:tickLblPos val="nextTo"/>
+        <c:spPr>
+          <a:noFill/>
+          <a:ln>
+            <a:noFill/>
+          </a:ln>
+          <a:effectLst/>
+        </c:spPr>
+        <c:txPr>
+          <a:bodyPr rot="-60000000" spcFirstLastPara="1" vertOverflow="ellipsis" vert="horz" wrap="square" anchor="ctr" anchorCtr="1"/>
+          <a:lstStyle/>
+          <a:p>
+            <a:pPr>
+              <a:defRPr sz="1050" b="0" i="0" u="none" strike="noStrike" kern="1200" baseline="0">
+                <a:solidFill>
+                  <a:schemeClr val="tx1"/>
+                </a:solidFill>
+                <a:latin typeface="Calibri" panose="020F0502020204030204" pitchFamily="34" charset="0"/>
+                <a:ea typeface="+mn-ea"/>
+                <a:cs typeface="Calibri" panose="020F0502020204030204" pitchFamily="34" charset="0"/>
+              </a:defRPr>
+            </a:pPr>
+            <a:endParaRPr lang="en-US"/>
+          </a:p>
+        </c:txPr>
+        <c:crossAx val="405814240"/>
+        <c:crosses val="autoZero"/>
+        <c:crossBetween val="between"/>
+      </c:valAx>
+      <c:spPr>
+        <a:noFill/>
+        <a:ln>
+          <a:noFill/>
+        </a:ln>
+        <a:effectLst/>
+      </c:spPr>
+    </c:plotArea>
+    <c:plotVisOnly val="1"/>
+    <c:dispBlanksAs val="gap"/>
+    <c:showDLblsOverMax val="0"/>
+  </c:chart>
+  <c:spPr>
+    <a:noFill/>
+    <a:ln>
+      <a:noFill/>
+    </a:ln>
+    <a:effectLst/>
+  </c:spPr>
+  <c:txPr>
+    <a:bodyPr/>
+    <a:lstStyle/>
+    <a:p>
+      <a:pPr>
+        <a:defRPr/>
+      </a:pPr>
+      <a:endParaRPr lang="en-US"/>
+    </a:p>
+  </c:txPr>
+  <c:externalData r:id="rId3">
+    <c:autoUpdate val="0"/>
+  </c:externalData>
+</c:chartSpace>
+</file>
+
+<file path=ppt/charts/colors1.xml><?xml version="1.0" encoding="utf-8"?>
+<cs:colorStyle xmlns:cs="http://schemas.microsoft.com/office/drawing/2012/chartStyle" xmlns:a="http://schemas.openxmlformats.org/drawingml/2006/main" meth="cycle" id="10">
+  <a:schemeClr val="accent1"/>
+  <a:schemeClr val="accent2"/>
+  <a:schemeClr val="accent3"/>
+  <a:schemeClr val="accent4"/>
+  <a:schemeClr val="accent5"/>
+  <a:schemeClr val="accent6"/>
+  <cs:variation/>
+  <cs:variation>
+    <a:lumMod val="60000"/>
+  </cs:variation>
+  <cs:variation>
+    <a:lumMod val="80000"/>
+    <a:lumOff val="20000"/>
+  </cs:variation>
+  <cs:variation>
+    <a:lumMod val="80000"/>
+  </cs:variation>
+  <cs:variation>
+    <a:lumMod val="60000"/>
+    <a:lumOff val="40000"/>
+  </cs:variation>
+  <cs:variation>
+    <a:lumMod val="50000"/>
+  </cs:variation>
+  <cs:variation>
+    <a:lumMod val="70000"/>
+    <a:lumOff val="30000"/>
+  </cs:variation>
+  <cs:variation>
+    <a:lumMod val="70000"/>
+  </cs:variation>
+  <cs:variation>
+    <a:lumMod val="50000"/>
+    <a:lumOff val="50000"/>
+  </cs:variation>
+</cs:colorStyle>
+</file>
+
+<file path=ppt/charts/style1.xml><?xml version="1.0" encoding="utf-8"?>
+<cs:chartStyle xmlns:cs="http://schemas.microsoft.com/office/drawing/2012/chartStyle" xmlns:a="http://schemas.openxmlformats.org/drawingml/2006/main" id="201">
+  <cs:axisTitle>
+    <cs:lnRef idx="0"/>
+    <cs:fillRef idx="0"/>
+    <cs:effectRef idx="0"/>
+    <cs:fontRef idx="minor">
+      <a:schemeClr val="tx1">
+        <a:lumMod val="65000"/>
+        <a:lumOff val="35000"/>
+      </a:schemeClr>
+    </cs:fontRef>
+    <cs:defRPr sz="1000" kern="1200"/>
+  </cs:axisTitle>
+  <cs:categoryAxis>
+    <cs:lnRef idx="0"/>
+    <cs:fillRef idx="0"/>
+    <cs:effectRef idx="0"/>
+    <cs:fontRef idx="minor">
+      <a:schemeClr val="tx1">
+        <a:lumMod val="65000"/>
+        <a:lumOff val="35000"/>
+      </a:schemeClr>
+    </cs:fontRef>
+    <cs:spPr>
+      <a:ln w="9525" cap="flat" cmpd="sng" algn="ctr">
+        <a:solidFill>
+          <a:schemeClr val="tx1">
+            <a:lumMod val="15000"/>
+            <a:lumOff val="85000"/>
+          </a:schemeClr>
+        </a:solidFill>
+        <a:round/>
+      </a:ln>
+    </cs:spPr>
+    <cs:defRPr sz="900" kern="1200"/>
+  </cs:categoryAxis>
+  <cs:chartArea mods="allowNoFillOverride allowNoLineOverride">
+    <cs:lnRef idx="0"/>
+    <cs:fillRef idx="0"/>
+    <cs:effectRef idx="0"/>
+    <cs:fontRef idx="minor">
+      <a:schemeClr val="tx1"/>
+    </cs:fontRef>
+    <cs:spPr>
+      <a:solidFill>
+        <a:schemeClr val="bg1"/>
+      </a:solidFill>
+      <a:ln w="9525" cap="flat" cmpd="sng" algn="ctr">
+        <a:solidFill>
+          <a:schemeClr val="tx1">
+            <a:lumMod val="15000"/>
+            <a:lumOff val="85000"/>
+          </a:schemeClr>
+        </a:solidFill>
+        <a:round/>
+      </a:ln>
+    </cs:spPr>
+    <cs:defRPr sz="1000" kern="1200"/>
+  </cs:chartArea>
+  <cs:dataLabel>
+    <cs:lnRef idx="0"/>
+    <cs:fillRef idx="0"/>
+    <cs:effectRef idx="0"/>
+    <cs:fontRef idx="minor">
+      <a:schemeClr val="tx1">
+        <a:lumMod val="75000"/>
+        <a:lumOff val="25000"/>
+      </a:schemeClr>
+    </cs:fontRef>
+    <cs:defRPr sz="900" kern="1200"/>
+  </cs:dataLabel>
+  <cs:dataLabelCallout>
+    <cs:lnRef idx="0"/>
+    <cs:fillRef idx="0"/>
+    <cs:effectRef idx="0"/>
+    <cs:fontRef idx="minor">
+      <a:schemeClr val="dk1">
+        <a:lumMod val="65000"/>
+        <a:lumOff val="35000"/>
+      </a:schemeClr>
+    </cs:fontRef>
+    <cs:spPr>
+      <a:solidFill>
+        <a:schemeClr val="lt1"/>
+      </a:solidFill>
+      <a:ln>
+        <a:solidFill>
+          <a:schemeClr val="dk1">
+            <a:lumMod val="25000"/>
+            <a:lumOff val="75000"/>
+          </a:schemeClr>
+        </a:solidFill>
+      </a:ln>
+    </cs:spPr>
+    <cs:defRPr sz="900" kern="1200"/>
+    <cs:bodyPr rot="0" spcFirstLastPara="1" vertOverflow="clip" horzOverflow="clip" vert="horz" wrap="square" lIns="36576" tIns="18288" rIns="36576" bIns="18288" anchor="ctr" anchorCtr="1">
+      <a:spAutoFit/>
+    </cs:bodyPr>
+  </cs:dataLabelCallout>
+  <cs:dataPoint>
+    <cs:lnRef idx="0"/>
+    <cs:fillRef idx="1">
+      <cs:styleClr val="auto"/>
+    </cs:fillRef>
+    <cs:effectRef idx="0"/>
+    <cs:fontRef idx="minor">
+      <a:schemeClr val="tx1"/>
+    </cs:fontRef>
+  </cs:dataPoint>
+  <cs:dataPoint3D>
+    <cs:lnRef idx="0"/>
+    <cs:fillRef idx="1">
+      <cs:styleClr val="auto"/>
+    </cs:fillRef>
+    <cs:effectRef idx="0"/>
+    <cs:fontRef idx="minor">
+      <a:schemeClr val="tx1"/>
+    </cs:fontRef>
+  </cs:dataPoint3D>
+  <cs:dataPointLine>
+    <cs:lnRef idx="0">
+      <cs:styleClr val="auto"/>
+    </cs:lnRef>
+    <cs:fillRef idx="1"/>
+    <cs:effectRef idx="0"/>
+    <cs:fontRef idx="minor">
+      <a:schemeClr val="tx1"/>
+    </cs:fontRef>
+    <cs:spPr>
+      <a:ln w="28575" cap="rnd">
+        <a:solidFill>
+          <a:schemeClr val="phClr"/>
+        </a:solidFill>
+        <a:round/>
+      </a:ln>
+    </cs:spPr>
+  </cs:dataPointLine>
+  <cs:dataPointMarker>
+    <cs:lnRef idx="0">
+      <cs:styleClr val="auto"/>
+    </cs:lnRef>
+    <cs:fillRef idx="1">
+      <cs:styleClr val="auto"/>
+    </cs:fillRef>
+    <cs:effectRef idx="0"/>
+    <cs:fontRef idx="minor">
+      <a:schemeClr val="tx1"/>
+    </cs:fontRef>
+    <cs:spPr>
+      <a:ln w="9525">
+        <a:solidFill>
+          <a:schemeClr val="phClr"/>
+        </a:solidFill>
+      </a:ln>
+    </cs:spPr>
+  </cs:dataPointMarker>
+  <cs:dataPointMarkerLayout symbol="circle" size="5"/>
+  <cs:dataPointWireframe>
+    <cs:lnRef idx="0">
+      <cs:styleClr val="auto"/>
+    </cs:lnRef>
+    <cs:fillRef idx="1"/>
+    <cs:effectRef idx="0"/>
+    <cs:fontRef idx="minor">
+      <a:schemeClr val="tx1"/>
+    </cs:fontRef>
+    <cs:spPr>
+      <a:ln w="9525" cap="rnd">
+        <a:solidFill>
+          <a:schemeClr val="phClr"/>
+        </a:solidFill>
+        <a:round/>
+      </a:ln>
+    </cs:spPr>
+  </cs:dataPointWireframe>
+  <cs:dataTable>
+    <cs:lnRef idx="0"/>
+    <cs:fillRef idx="0"/>
+    <cs:effectRef idx="0"/>
+    <cs:fontRef idx="minor">
+      <a:schemeClr val="tx1">
+        <a:lumMod val="65000"/>
+        <a:lumOff val="35000"/>
+      </a:schemeClr>
+    </cs:fontRef>
+    <cs:spPr>
+      <a:noFill/>
+      <a:ln w="9525" cap="flat" cmpd="sng" algn="ctr">
+        <a:solidFill>
+          <a:schemeClr val="tx1">
+            <a:lumMod val="15000"/>
+            <a:lumOff val="85000"/>
+          </a:schemeClr>
+        </a:solidFill>
+        <a:round/>
+      </a:ln>
+    </cs:spPr>
+    <cs:defRPr sz="900" kern="1200"/>
+  </cs:dataTable>
+  <cs:downBar>
+    <cs:lnRef idx="0"/>
+    <cs:fillRef idx="0"/>
+    <cs:effectRef idx="0"/>
+    <cs:fontRef idx="minor">
+      <a:schemeClr val="dk1"/>
+    </cs:fontRef>
+    <cs:spPr>
+      <a:solidFill>
+        <a:schemeClr val="dk1">
+          <a:lumMod val="65000"/>
+          <a:lumOff val="35000"/>
+        </a:schemeClr>
+      </a:solidFill>
+      <a:ln w="9525">
+        <a:solidFill>
+          <a:schemeClr val="tx1">
+            <a:lumMod val="65000"/>
+            <a:lumOff val="35000"/>
+          </a:schemeClr>
+        </a:solidFill>
+      </a:ln>
+    </cs:spPr>
+  </cs:downBar>
+  <cs:dropLine>
+    <cs:lnRef idx="0"/>
+    <cs:fillRef idx="0"/>
+    <cs:effectRef idx="0"/>
+    <cs:fontRef idx="minor">
+      <a:schemeClr val="tx1"/>
+    </cs:fontRef>
+    <cs:spPr>
+      <a:ln w="9525" cap="flat" cmpd="sng" algn="ctr">
+        <a:solidFill>
+          <a:schemeClr val="tx1">
+            <a:lumMod val="35000"/>
+            <a:lumOff val="65000"/>
+          </a:schemeClr>
+        </a:solidFill>
+        <a:round/>
+      </a:ln>
+    </cs:spPr>
+  </cs:dropLine>
+  <cs:errorBar>
+    <cs:lnRef idx="0"/>
+    <cs:fillRef idx="0"/>
+    <cs:effectRef idx="0"/>
+    <cs:fontRef idx="minor">
+      <a:schemeClr val="tx1"/>
+    </cs:fontRef>
+    <cs:spPr>
+      <a:ln w="9525" cap="flat" cmpd="sng" algn="ctr">
+        <a:solidFill>
+          <a:schemeClr val="tx1">
+            <a:lumMod val="65000"/>
+            <a:lumOff val="35000"/>
+          </a:schemeClr>
+        </a:solidFill>
+        <a:round/>
+      </a:ln>
+    </cs:spPr>
+  </cs:errorBar>
+  <cs:floor>
+    <cs:lnRef idx="0"/>
+    <cs:fillRef idx="0"/>
+    <cs:effectRef idx="0"/>
+    <cs:fontRef idx="minor">
+      <a:schemeClr val="tx1"/>
+    </cs:fontRef>
+    <cs:spPr>
+      <a:noFill/>
+      <a:ln>
+        <a:noFill/>
+      </a:ln>
+    </cs:spPr>
+  </cs:floor>
+  <cs:gridlineMajor>
+    <cs:lnRef idx="0"/>
+    <cs:fillRef idx="0"/>
+    <cs:effectRef idx="0"/>
+    <cs:fontRef idx="minor">
+      <a:schemeClr val="tx1"/>
+    </cs:fontRef>
+    <cs:spPr>
+      <a:ln w="9525" cap="flat" cmpd="sng" algn="ctr">
+        <a:solidFill>
+          <a:schemeClr val="tx1">
+            <a:lumMod val="15000"/>
+            <a:lumOff val="85000"/>
+          </a:schemeClr>
+        </a:solidFill>
+        <a:round/>
+      </a:ln>
+    </cs:spPr>
+  </cs:gridlineMajor>
+  <cs:gridlineMinor>
+    <cs:lnRef idx="0"/>
+    <cs:fillRef idx="0"/>
+    <cs:effectRef idx="0"/>
+    <cs:fontRef idx="minor">
+      <a:schemeClr val="tx1"/>
+    </cs:fontRef>
+    <cs:spPr>
+      <a:ln w="9525" cap="flat" cmpd="sng" algn="ctr">
+        <a:solidFill>
+          <a:schemeClr val="tx1">
+            <a:lumMod val="5000"/>
+            <a:lumOff val="95000"/>
+          </a:schemeClr>
+        </a:solidFill>
+        <a:round/>
+      </a:ln>
+    </cs:spPr>
+  </cs:gridlineMinor>
+  <cs:hiLoLine>
+    <cs:lnRef idx="0"/>
+    <cs:fillRef idx="0"/>
+    <cs:effectRef idx="0"/>
+    <cs:fontRef idx="minor">
+      <a:schemeClr val="tx1"/>
+    </cs:fontRef>
+    <cs:spPr>
+      <a:ln w="9525" cap="flat" cmpd="sng" algn="ctr">
+        <a:solidFill>
+          <a:schemeClr val="tx1">
+            <a:lumMod val="75000"/>
+            <a:lumOff val="25000"/>
+          </a:schemeClr>
+        </a:solidFill>
+        <a:round/>
+      </a:ln>
+    </cs:spPr>
+  </cs:hiLoLine>
+  <cs:leaderLine>
+    <cs:lnRef idx="0"/>
+    <cs:fillRef idx="0"/>
+    <cs:effectRef idx="0"/>
+    <cs:fontRef idx="minor">
+      <a:schemeClr val="tx1"/>
+    </cs:fontRef>
+    <cs:spPr>
+      <a:ln w="9525" cap="flat" cmpd="sng" algn="ctr">
+        <a:solidFill>
+          <a:schemeClr val="tx1">
+            <a:lumMod val="35000"/>
+            <a:lumOff val="65000"/>
+          </a:schemeClr>
+        </a:solidFill>
+        <a:round/>
+      </a:ln>
+    </cs:spPr>
+  </cs:leaderLine>
+  <cs:legend>
+    <cs:lnRef idx="0"/>
+    <cs:fillRef idx="0"/>
+    <cs:effectRef idx="0"/>
+    <cs:fontRef idx="minor">
+      <a:schemeClr val="tx1">
+        <a:lumMod val="65000"/>
+        <a:lumOff val="35000"/>
+      </a:schemeClr>
+    </cs:fontRef>
+    <cs:defRPr sz="900" kern="1200"/>
+  </cs:legend>
+  <cs:plotArea mods="allowNoFillOverride allowNoLineOverride">
+    <cs:lnRef idx="0"/>
+    <cs:fillRef idx="0"/>
+    <cs:effectRef idx="0"/>
+    <cs:fontRef idx="minor">
+      <a:schemeClr val="tx1"/>
+    </cs:fontRef>
+  </cs:plotArea>
+  <cs:plotArea3D mods="allowNoFillOverride allowNoLineOverride">
+    <cs:lnRef idx="0"/>
+    <cs:fillRef idx="0"/>
+    <cs:effectRef idx="0"/>
+    <cs:fontRef idx="minor">
+      <a:schemeClr val="tx1"/>
+    </cs:fontRef>
+  </cs:plotArea3D>
+  <cs:seriesAxis>
+    <cs:lnRef idx="0"/>
+    <cs:fillRef idx="0"/>
+    <cs:effectRef idx="0"/>
+    <cs:fontRef idx="minor">
+      <a:schemeClr val="tx1">
+        <a:lumMod val="65000"/>
+        <a:lumOff val="35000"/>
+      </a:schemeClr>
+    </cs:fontRef>
+    <cs:defRPr sz="900" kern="1200"/>
+  </cs:seriesAxis>
+  <cs:seriesLine>
+    <cs:lnRef idx="0"/>
+    <cs:fillRef idx="0"/>
+    <cs:effectRef idx="0"/>
+    <cs:fontRef idx="minor">
+      <a:schemeClr val="tx1"/>
+    </cs:fontRef>
+    <cs:spPr>
+      <a:ln w="9525" cap="flat" cmpd="sng" algn="ctr">
+        <a:solidFill>
+          <a:schemeClr val="tx1">
+            <a:lumMod val="35000"/>
+            <a:lumOff val="65000"/>
+          </a:schemeClr>
+        </a:solidFill>
+        <a:round/>
+      </a:ln>
+    </cs:spPr>
+  </cs:seriesLine>
+  <cs:title>
+    <cs:lnRef idx="0"/>
+    <cs:fillRef idx="0"/>
+    <cs:effectRef idx="0"/>
+    <cs:fontRef idx="minor">
+      <a:schemeClr val="tx1">
+        <a:lumMod val="65000"/>
+        <a:lumOff val="35000"/>
+      </a:schemeClr>
+    </cs:fontRef>
+    <cs:defRPr sz="1400" b="0" kern="1200" spc="0" baseline="0"/>
+  </cs:title>
+  <cs:trendline>
+    <cs:lnRef idx="0">
+      <cs:styleClr val="auto"/>
+    </cs:lnRef>
+    <cs:fillRef idx="0"/>
+    <cs:effectRef idx="0"/>
+    <cs:fontRef idx="minor">
+      <a:schemeClr val="tx1"/>
+    </cs:fontRef>
+    <cs:spPr>
+      <a:ln w="19050" cap="rnd">
+        <a:solidFill>
+          <a:schemeClr val="phClr"/>
+        </a:solidFill>
+        <a:prstDash val="sysDot"/>
+      </a:ln>
+    </cs:spPr>
+  </cs:trendline>
+  <cs:trendlineLabel>
+    <cs:lnRef idx="0"/>
+    <cs:fillRef idx="0"/>
+    <cs:effectRef idx="0"/>
+    <cs:fontRef idx="minor">
+      <a:schemeClr val="tx1">
+        <a:lumMod val="65000"/>
+        <a:lumOff val="35000"/>
+      </a:schemeClr>
+    </cs:fontRef>
+    <cs:defRPr sz="900" kern="1200"/>
+  </cs:trendlineLabel>
+  <cs:upBar>
+    <cs:lnRef idx="0"/>
+    <cs:fillRef idx="0"/>
+    <cs:effectRef idx="0"/>
+    <cs:fontRef idx="minor">
+      <a:schemeClr val="dk1"/>
+    </cs:fontRef>
+    <cs:spPr>
+      <a:solidFill>
+        <a:schemeClr val="lt1"/>
+      </a:solidFill>
+      <a:ln w="9525">
+        <a:solidFill>
+          <a:schemeClr val="tx1">
+            <a:lumMod val="15000"/>
+            <a:lumOff val="85000"/>
+          </a:schemeClr>
+        </a:solidFill>
+      </a:ln>
+    </cs:spPr>
+  </cs:upBar>
+  <cs:valueAxis>
+    <cs:lnRef idx="0"/>
+    <cs:fillRef idx="0"/>
+    <cs:effectRef idx="0"/>
+    <cs:fontRef idx="minor">
+      <a:schemeClr val="tx1">
+        <a:lumMod val="65000"/>
+        <a:lumOff val="35000"/>
+      </a:schemeClr>
+    </cs:fontRef>
+    <cs:defRPr sz="900" kern="1200"/>
+  </cs:valueAxis>
+  <cs:wall>
+    <cs:lnRef idx="0"/>
+    <cs:fillRef idx="0"/>
+    <cs:effectRef idx="0"/>
+    <cs:fontRef idx="minor">
+      <a:schemeClr val="tx1"/>
+    </cs:fontRef>
+    <cs:spPr>
+      <a:noFill/>
+      <a:ln>
+        <a:noFill/>
+      </a:ln>
+    </cs:spPr>
+  </cs:wall>
+</cs:chartStyle>
 </file>
 
 <file path=ppt/notesMasters/notesMaster1.xml><?xml version="1.0" encoding="utf-8"?>
@@ -15007,7 +15862,7 @@
     <mc:Choice Requires="p14">
       <p:transition spd="slow" p14:dur="2000"/>
     </mc:Choice>
-    <mc:Fallback xmlns:p15="http://schemas.microsoft.com/office/powerpoint/2012/main" xmlns="">
+    <mc:Fallback xmlns="" xmlns:p15="http://schemas.microsoft.com/office/powerpoint/2012/main">
       <p:transition spd="slow"/>
     </mc:Fallback>
   </mc:AlternateContent>
@@ -16544,7 +17399,7 @@
     <mc:Choice Requires="p14">
       <p:transition spd="slow" p14:dur="2000"/>
     </mc:Choice>
-    <mc:Fallback xmlns:p15="http://schemas.microsoft.com/office/powerpoint/2012/main" xmlns="">
+    <mc:Fallback xmlns="" xmlns:p15="http://schemas.microsoft.com/office/powerpoint/2012/main">
       <p:transition spd="slow"/>
     </mc:Fallback>
   </mc:AlternateContent>
@@ -17179,7 +18034,7 @@
     <mc:Choice Requires="p14">
       <p:transition spd="slow" p14:dur="2000"/>
     </mc:Choice>
-    <mc:Fallback xmlns:p15="http://schemas.microsoft.com/office/powerpoint/2012/main" xmlns="">
+    <mc:Fallback xmlns="" xmlns:p15="http://schemas.microsoft.com/office/powerpoint/2012/main">
       <p:transition spd="slow"/>
     </mc:Fallback>
   </mc:AlternateContent>
@@ -20700,7 +21555,7 @@
     <mc:Choice Requires="p14">
       <p:transition spd="slow" p14:dur="2000"/>
     </mc:Choice>
-    <mc:Fallback xmlns:p15="http://schemas.microsoft.com/office/powerpoint/2012/main" xmlns="">
+    <mc:Fallback xmlns="" xmlns:p15="http://schemas.microsoft.com/office/powerpoint/2012/main">
       <p:transition spd="slow"/>
     </mc:Fallback>
   </mc:AlternateContent>
@@ -22970,7 +23825,7 @@
     <mc:Choice Requires="p14">
       <p:transition spd="slow" p14:dur="2000"/>
     </mc:Choice>
-    <mc:Fallback xmlns:p15="http://schemas.microsoft.com/office/powerpoint/2012/main" xmlns="">
+    <mc:Fallback xmlns="" xmlns:p15="http://schemas.microsoft.com/office/powerpoint/2012/main">
       <p:transition spd="slow"/>
     </mc:Fallback>
   </mc:AlternateContent>
@@ -25230,7 +26085,7 @@
     <mc:Choice Requires="p14">
       <p:transition spd="slow" p14:dur="2000"/>
     </mc:Choice>
-    <mc:Fallback xmlns:p15="http://schemas.microsoft.com/office/powerpoint/2012/main" xmlns="">
+    <mc:Fallback xmlns="" xmlns:p15="http://schemas.microsoft.com/office/powerpoint/2012/main">
       <p:transition spd="slow"/>
     </mc:Fallback>
   </mc:AlternateContent>
@@ -25245,6 +26100,60 @@
 </file>
 
 <file path=ppt/slides/slide15.xml><?xml version="1.0" encoding="utf-8"?>
+<p:sld xmlns:a="http://schemas.openxmlformats.org/drawingml/2006/main" xmlns:r="http://schemas.openxmlformats.org/officeDocument/2006/relationships" xmlns:p="http://schemas.openxmlformats.org/presentationml/2006/main">
+  <p:cSld>
+    <p:spTree>
+      <p:nvGrpSpPr>
+        <p:cNvPr id="1" name=""/>
+        <p:cNvGrpSpPr/>
+        <p:nvPr/>
+      </p:nvGrpSpPr>
+      <p:grpSpPr>
+        <a:xfrm>
+          <a:off x="0" y="0"/>
+          <a:ext cx="0" cy="0"/>
+          <a:chOff x="0" y="0"/>
+          <a:chExt cx="0" cy="0"/>
+        </a:xfrm>
+      </p:grpSpPr>
+      <p:graphicFrame>
+        <p:nvGraphicFramePr>
+          <p:cNvPr id="4" name="Chart 3"/>
+          <p:cNvGraphicFramePr>
+            <a:graphicFrameLocks/>
+          </p:cNvGraphicFramePr>
+          <p:nvPr>
+            <p:extLst>
+              <p:ext uri="{D42A27DB-BD31-4B8C-83A1-F6EECF244321}">
+                <p14:modId xmlns:p14="http://schemas.microsoft.com/office/powerpoint/2010/main" val="1303911657"/>
+              </p:ext>
+            </p:extLst>
+          </p:nvPr>
+        </p:nvGraphicFramePr>
+        <p:xfrm>
+          <a:off x="3667125" y="2057400"/>
+          <a:ext cx="4857750" cy="2743200"/>
+        </p:xfrm>
+        <a:graphic>
+          <a:graphicData uri="http://schemas.openxmlformats.org/drawingml/2006/chart">
+            <c:chart xmlns:c="http://schemas.openxmlformats.org/drawingml/2006/chart" xmlns:r="http://schemas.openxmlformats.org/officeDocument/2006/relationships" r:id="rId2"/>
+          </a:graphicData>
+        </a:graphic>
+      </p:graphicFrame>
+    </p:spTree>
+    <p:extLst>
+      <p:ext uri="{BB962C8B-B14F-4D97-AF65-F5344CB8AC3E}">
+        <p14:creationId xmlns:p14="http://schemas.microsoft.com/office/powerpoint/2010/main" val="2492298328"/>
+      </p:ext>
+    </p:extLst>
+  </p:cSld>
+  <p:clrMapOvr>
+    <a:masterClrMapping/>
+  </p:clrMapOvr>
+</p:sld>
+</file>
+
+<file path=ppt/slides/slide16.xml><?xml version="1.0" encoding="utf-8"?>
 <p:sld xmlns:a="http://schemas.openxmlformats.org/drawingml/2006/main" xmlns:r="http://schemas.openxmlformats.org/officeDocument/2006/relationships" xmlns:p="http://schemas.openxmlformats.org/presentationml/2006/main">
   <p:cSld>
     <p:spTree>
@@ -25615,7 +26524,7 @@
     <mc:Choice Requires="p14">
       <p:transition spd="slow" p14:dur="2000"/>
     </mc:Choice>
-    <mc:Fallback xmlns:p15="http://schemas.microsoft.com/office/powerpoint/2012/main" xmlns="">
+    <mc:Fallback xmlns="" xmlns:p15="http://schemas.microsoft.com/office/powerpoint/2012/main">
       <p:transition spd="slow"/>
     </mc:Fallback>
   </mc:AlternateContent>
@@ -28519,7 +29428,7 @@
     <mc:Choice Requires="p14">
       <p:transition spd="slow" p14:dur="2000"/>
     </mc:Choice>
-    <mc:Fallback xmlns:p15="http://schemas.microsoft.com/office/powerpoint/2012/main" xmlns="">
+    <mc:Fallback xmlns="" xmlns:p15="http://schemas.microsoft.com/office/powerpoint/2012/main">
       <p:transition spd="slow"/>
     </mc:Fallback>
   </mc:AlternateContent>
@@ -31180,7 +32089,7 @@
     <mc:Choice Requires="p14">
       <p:transition spd="slow" p14:dur="2000"/>
     </mc:Choice>
-    <mc:Fallback xmlns:p15="http://schemas.microsoft.com/office/powerpoint/2012/main" xmlns="">
+    <mc:Fallback xmlns="" xmlns:p15="http://schemas.microsoft.com/office/powerpoint/2012/main">
       <p:transition spd="slow"/>
     </mc:Fallback>
   </mc:AlternateContent>
@@ -37780,7 +38689,7 @@
     <mc:Choice Requires="p14">
       <p:transition spd="slow" p14:dur="2000"/>
     </mc:Choice>
-    <mc:Fallback xmlns:p15="http://schemas.microsoft.com/office/powerpoint/2012/main" xmlns="">
+    <mc:Fallback xmlns="" xmlns:p15="http://schemas.microsoft.com/office/powerpoint/2012/main">
       <p:transition spd="slow"/>
     </mc:Fallback>
   </mc:AlternateContent>
@@ -42833,7 +43742,7 @@
     <mc:Choice Requires="p14">
       <p:transition spd="slow" p14:dur="2000"/>
     </mc:Choice>
-    <mc:Fallback xmlns:p15="http://schemas.microsoft.com/office/powerpoint/2012/main" xmlns="">
+    <mc:Fallback xmlns="" xmlns:p15="http://schemas.microsoft.com/office/powerpoint/2012/main">
       <p:transition spd="slow"/>
     </mc:Fallback>
   </mc:AlternateContent>
@@ -42981,7 +43890,7 @@
     <mc:Choice Requires="p14">
       <p:transition spd="slow" p14:dur="2000"/>
     </mc:Choice>
-    <mc:Fallback xmlns:p15="http://schemas.microsoft.com/office/powerpoint/2012/main" xmlns="">
+    <mc:Fallback xmlns="" xmlns:p15="http://schemas.microsoft.com/office/powerpoint/2012/main">
       <p:transition spd="slow"/>
     </mc:Fallback>
   </mc:AlternateContent>
@@ -43544,7 +44453,7 @@
     <mc:Choice Requires="p14">
       <p:transition spd="slow" p14:dur="2000"/>
     </mc:Choice>
-    <mc:Fallback xmlns:p15="http://schemas.microsoft.com/office/powerpoint/2012/main" xmlns="">
+    <mc:Fallback xmlns="" xmlns:p15="http://schemas.microsoft.com/office/powerpoint/2012/main">
       <p:transition spd="slow"/>
     </mc:Fallback>
   </mc:AlternateContent>
@@ -45441,7 +46350,7 @@
     <mc:Choice Requires="p14">
       <p:transition spd="slow" p14:dur="2000"/>
     </mc:Choice>
-    <mc:Fallback xmlns:p15="http://schemas.microsoft.com/office/powerpoint/2012/main" xmlns="">
+    <mc:Fallback xmlns="" xmlns:p15="http://schemas.microsoft.com/office/powerpoint/2012/main">
       <p:transition spd="slow"/>
     </mc:Fallback>
   </mc:AlternateContent>
@@ -48244,7 +49153,7 @@
     <mc:Choice Requires="p14">
       <p:transition spd="slow" p14:dur="2000"/>
     </mc:Choice>
-    <mc:Fallback xmlns:p15="http://schemas.microsoft.com/office/powerpoint/2012/main" xmlns="">
+    <mc:Fallback xmlns="" xmlns:p15="http://schemas.microsoft.com/office/powerpoint/2012/main">
       <p:transition spd="slow"/>
     </mc:Fallback>
   </mc:AlternateContent>

</xml_diff>